<commit_message>
added dedicated figures for each fokus node
</commit_message>
<xml_diff>
--- a/docs/Testbed-Design/figures/reThinkTestbed-Fokus-Node.pptx
+++ b/docs/Testbed-Design/figures/reThinkTestbed-Fokus-Node.pptx
@@ -6,6 +6,8 @@
   </p:sldMasterIdLst>
   <p:sldIdLst>
     <p:sldId id="259" r:id="rId2"/>
+    <p:sldId id="260" r:id="rId3"/>
+    <p:sldId id="261" r:id="rId4"/>
   </p:sldIdLst>
   <p:sldSz cx="9144000" cy="6858000" type="screen4x3"/>
   <p:notesSz cx="6858000" cy="9144000"/>
@@ -289,7 +291,7 @@
             <a:fld id="{2C59F9AD-AC7D-47D0-978F-DB0960CE5219}" type="datetimeFigureOut">
               <a:rPr lang="en-US" smtClean="0"/>
               <a:pPr/>
-              <a:t>18.01.2016</a:t>
+              <a:t>29.03.2016</a:t>
             </a:fld>
             <a:endParaRPr lang="en-US"/>
           </a:p>
@@ -341,7 +343,7 @@
     </p:spTree>
     <p:extLst>
       <p:ext uri="{BB962C8B-B14F-4D97-AF65-F5344CB8AC3E}">
-        <p14:creationId xmlns="" xmlns:a="http://schemas.openxmlformats.org/drawingml/2006/main" xmlns:r="http://schemas.openxmlformats.org/officeDocument/2006/relationships" xmlns:p="http://schemas.openxmlformats.org/presentationml/2006/main" xmlns:p14="http://schemas.microsoft.com/office/powerpoint/2010/main" xmlns:mv="urn:schemas-microsoft-com:mac:vml" xmlns:mc="http://schemas.openxmlformats.org/markup-compatibility/2006" val="1287589428"/>
+        <p14:creationId xmlns:mc="http://schemas.openxmlformats.org/markup-compatibility/2006" xmlns:mv="urn:schemas-microsoft-com:mac:vml" xmlns:p14="http://schemas.microsoft.com/office/powerpoint/2010/main" xmlns:p="http://schemas.openxmlformats.org/presentationml/2006/main" xmlns:r="http://schemas.openxmlformats.org/officeDocument/2006/relationships" xmlns:a="http://schemas.openxmlformats.org/drawingml/2006/main" xmlns="" val="1287589428"/>
       </p:ext>
     </p:extLst>
   </p:cSld>
@@ -461,7 +463,7 @@
             <a:fld id="{2C59F9AD-AC7D-47D0-978F-DB0960CE5219}" type="datetimeFigureOut">
               <a:rPr lang="en-US" smtClean="0"/>
               <a:pPr/>
-              <a:t>18.01.2016</a:t>
+              <a:t>29.03.2016</a:t>
             </a:fld>
             <a:endParaRPr lang="en-US"/>
           </a:p>
@@ -513,7 +515,7 @@
     </p:spTree>
     <p:extLst>
       <p:ext uri="{BB962C8B-B14F-4D97-AF65-F5344CB8AC3E}">
-        <p14:creationId xmlns="" xmlns:a="http://schemas.openxmlformats.org/drawingml/2006/main" xmlns:r="http://schemas.openxmlformats.org/officeDocument/2006/relationships" xmlns:p="http://schemas.openxmlformats.org/presentationml/2006/main" xmlns:p14="http://schemas.microsoft.com/office/powerpoint/2010/main" xmlns:mv="urn:schemas-microsoft-com:mac:vml" xmlns:mc="http://schemas.openxmlformats.org/markup-compatibility/2006" val="1240793147"/>
+        <p14:creationId xmlns:mc="http://schemas.openxmlformats.org/markup-compatibility/2006" xmlns:mv="urn:schemas-microsoft-com:mac:vml" xmlns:p14="http://schemas.microsoft.com/office/powerpoint/2010/main" xmlns:p="http://schemas.openxmlformats.org/presentationml/2006/main" xmlns:r="http://schemas.openxmlformats.org/officeDocument/2006/relationships" xmlns:a="http://schemas.openxmlformats.org/drawingml/2006/main" xmlns="" val="1240793147"/>
       </p:ext>
     </p:extLst>
   </p:cSld>
@@ -643,7 +645,7 @@
             <a:fld id="{2C59F9AD-AC7D-47D0-978F-DB0960CE5219}" type="datetimeFigureOut">
               <a:rPr lang="en-US" smtClean="0"/>
               <a:pPr/>
-              <a:t>18.01.2016</a:t>
+              <a:t>29.03.2016</a:t>
             </a:fld>
             <a:endParaRPr lang="en-US"/>
           </a:p>
@@ -695,7 +697,7 @@
     </p:spTree>
     <p:extLst>
       <p:ext uri="{BB962C8B-B14F-4D97-AF65-F5344CB8AC3E}">
-        <p14:creationId xmlns="" xmlns:a="http://schemas.openxmlformats.org/drawingml/2006/main" xmlns:r="http://schemas.openxmlformats.org/officeDocument/2006/relationships" xmlns:p="http://schemas.openxmlformats.org/presentationml/2006/main" xmlns:p14="http://schemas.microsoft.com/office/powerpoint/2010/main" xmlns:mv="urn:schemas-microsoft-com:mac:vml" xmlns:mc="http://schemas.openxmlformats.org/markup-compatibility/2006" val="2172703429"/>
+        <p14:creationId xmlns:mc="http://schemas.openxmlformats.org/markup-compatibility/2006" xmlns:mv="urn:schemas-microsoft-com:mac:vml" xmlns:p14="http://schemas.microsoft.com/office/powerpoint/2010/main" xmlns:p="http://schemas.openxmlformats.org/presentationml/2006/main" xmlns:r="http://schemas.openxmlformats.org/officeDocument/2006/relationships" xmlns:a="http://schemas.openxmlformats.org/drawingml/2006/main" xmlns="" val="2172703429"/>
       </p:ext>
     </p:extLst>
   </p:cSld>
@@ -815,7 +817,7 @@
             <a:fld id="{2C59F9AD-AC7D-47D0-978F-DB0960CE5219}" type="datetimeFigureOut">
               <a:rPr lang="en-US" smtClean="0"/>
               <a:pPr/>
-              <a:t>18.01.2016</a:t>
+              <a:t>29.03.2016</a:t>
             </a:fld>
             <a:endParaRPr lang="en-US"/>
           </a:p>
@@ -867,7 +869,7 @@
     </p:spTree>
     <p:extLst>
       <p:ext uri="{BB962C8B-B14F-4D97-AF65-F5344CB8AC3E}">
-        <p14:creationId xmlns="" xmlns:a="http://schemas.openxmlformats.org/drawingml/2006/main" xmlns:r="http://schemas.openxmlformats.org/officeDocument/2006/relationships" xmlns:p="http://schemas.openxmlformats.org/presentationml/2006/main" xmlns:p14="http://schemas.microsoft.com/office/powerpoint/2010/main" xmlns:mv="urn:schemas-microsoft-com:mac:vml" xmlns:mc="http://schemas.openxmlformats.org/markup-compatibility/2006" val="4294398382"/>
+        <p14:creationId xmlns:mc="http://schemas.openxmlformats.org/markup-compatibility/2006" xmlns:mv="urn:schemas-microsoft-com:mac:vml" xmlns:p14="http://schemas.microsoft.com/office/powerpoint/2010/main" xmlns:p="http://schemas.openxmlformats.org/presentationml/2006/main" xmlns:r="http://schemas.openxmlformats.org/officeDocument/2006/relationships" xmlns:a="http://schemas.openxmlformats.org/drawingml/2006/main" xmlns="" val="4294398382"/>
       </p:ext>
     </p:extLst>
   </p:cSld>
@@ -1063,7 +1065,7 @@
             <a:fld id="{2C59F9AD-AC7D-47D0-978F-DB0960CE5219}" type="datetimeFigureOut">
               <a:rPr lang="en-US" smtClean="0"/>
               <a:pPr/>
-              <a:t>18.01.2016</a:t>
+              <a:t>29.03.2016</a:t>
             </a:fld>
             <a:endParaRPr lang="en-US"/>
           </a:p>
@@ -1115,7 +1117,7 @@
     </p:spTree>
     <p:extLst>
       <p:ext uri="{BB962C8B-B14F-4D97-AF65-F5344CB8AC3E}">
-        <p14:creationId xmlns="" xmlns:a="http://schemas.openxmlformats.org/drawingml/2006/main" xmlns:r="http://schemas.openxmlformats.org/officeDocument/2006/relationships" xmlns:p="http://schemas.openxmlformats.org/presentationml/2006/main" xmlns:p14="http://schemas.microsoft.com/office/powerpoint/2010/main" xmlns:mv="urn:schemas-microsoft-com:mac:vml" xmlns:mc="http://schemas.openxmlformats.org/markup-compatibility/2006" val="2072317617"/>
+        <p14:creationId xmlns:mc="http://schemas.openxmlformats.org/markup-compatibility/2006" xmlns:mv="urn:schemas-microsoft-com:mac:vml" xmlns:p14="http://schemas.microsoft.com/office/powerpoint/2010/main" xmlns:p="http://schemas.openxmlformats.org/presentationml/2006/main" xmlns:r="http://schemas.openxmlformats.org/officeDocument/2006/relationships" xmlns:a="http://schemas.openxmlformats.org/drawingml/2006/main" xmlns="" val="2072317617"/>
       </p:ext>
     </p:extLst>
   </p:cSld>
@@ -1353,7 +1355,7 @@
             <a:fld id="{2C59F9AD-AC7D-47D0-978F-DB0960CE5219}" type="datetimeFigureOut">
               <a:rPr lang="en-US" smtClean="0"/>
               <a:pPr/>
-              <a:t>18.01.2016</a:t>
+              <a:t>29.03.2016</a:t>
             </a:fld>
             <a:endParaRPr lang="en-US"/>
           </a:p>
@@ -1405,7 +1407,7 @@
     </p:spTree>
     <p:extLst>
       <p:ext uri="{BB962C8B-B14F-4D97-AF65-F5344CB8AC3E}">
-        <p14:creationId xmlns="" xmlns:a="http://schemas.openxmlformats.org/drawingml/2006/main" xmlns:r="http://schemas.openxmlformats.org/officeDocument/2006/relationships" xmlns:p="http://schemas.openxmlformats.org/presentationml/2006/main" xmlns:p14="http://schemas.microsoft.com/office/powerpoint/2010/main" xmlns:mv="urn:schemas-microsoft-com:mac:vml" xmlns:mc="http://schemas.openxmlformats.org/markup-compatibility/2006" val="3430870833"/>
+        <p14:creationId xmlns:mc="http://schemas.openxmlformats.org/markup-compatibility/2006" xmlns:mv="urn:schemas-microsoft-com:mac:vml" xmlns:p14="http://schemas.microsoft.com/office/powerpoint/2010/main" xmlns:p="http://schemas.openxmlformats.org/presentationml/2006/main" xmlns:r="http://schemas.openxmlformats.org/officeDocument/2006/relationships" xmlns:a="http://schemas.openxmlformats.org/drawingml/2006/main" xmlns="" val="3430870833"/>
       </p:ext>
     </p:extLst>
   </p:cSld>
@@ -1777,7 +1779,7 @@
             <a:fld id="{2C59F9AD-AC7D-47D0-978F-DB0960CE5219}" type="datetimeFigureOut">
               <a:rPr lang="en-US" smtClean="0"/>
               <a:pPr/>
-              <a:t>18.01.2016</a:t>
+              <a:t>29.03.2016</a:t>
             </a:fld>
             <a:endParaRPr lang="en-US"/>
           </a:p>
@@ -1829,7 +1831,7 @@
     </p:spTree>
     <p:extLst>
       <p:ext uri="{BB962C8B-B14F-4D97-AF65-F5344CB8AC3E}">
-        <p14:creationId xmlns="" xmlns:a="http://schemas.openxmlformats.org/drawingml/2006/main" xmlns:r="http://schemas.openxmlformats.org/officeDocument/2006/relationships" xmlns:p="http://schemas.openxmlformats.org/presentationml/2006/main" xmlns:p14="http://schemas.microsoft.com/office/powerpoint/2010/main" xmlns:mv="urn:schemas-microsoft-com:mac:vml" xmlns:mc="http://schemas.openxmlformats.org/markup-compatibility/2006" val="246921264"/>
+        <p14:creationId xmlns:mc="http://schemas.openxmlformats.org/markup-compatibility/2006" xmlns:mv="urn:schemas-microsoft-com:mac:vml" xmlns:p14="http://schemas.microsoft.com/office/powerpoint/2010/main" xmlns:p="http://schemas.openxmlformats.org/presentationml/2006/main" xmlns:r="http://schemas.openxmlformats.org/officeDocument/2006/relationships" xmlns:a="http://schemas.openxmlformats.org/drawingml/2006/main" xmlns="" val="246921264"/>
       </p:ext>
     </p:extLst>
   </p:cSld>
@@ -1897,7 +1899,7 @@
             <a:fld id="{2C59F9AD-AC7D-47D0-978F-DB0960CE5219}" type="datetimeFigureOut">
               <a:rPr lang="en-US" smtClean="0"/>
               <a:pPr/>
-              <a:t>18.01.2016</a:t>
+              <a:t>29.03.2016</a:t>
             </a:fld>
             <a:endParaRPr lang="en-US"/>
           </a:p>
@@ -1949,7 +1951,7 @@
     </p:spTree>
     <p:extLst>
       <p:ext uri="{BB962C8B-B14F-4D97-AF65-F5344CB8AC3E}">
-        <p14:creationId xmlns="" xmlns:a="http://schemas.openxmlformats.org/drawingml/2006/main" xmlns:r="http://schemas.openxmlformats.org/officeDocument/2006/relationships" xmlns:p="http://schemas.openxmlformats.org/presentationml/2006/main" xmlns:p14="http://schemas.microsoft.com/office/powerpoint/2010/main" xmlns:mv="urn:schemas-microsoft-com:mac:vml" xmlns:mc="http://schemas.openxmlformats.org/markup-compatibility/2006" val="2833871767"/>
+        <p14:creationId xmlns:mc="http://schemas.openxmlformats.org/markup-compatibility/2006" xmlns:mv="urn:schemas-microsoft-com:mac:vml" xmlns:p14="http://schemas.microsoft.com/office/powerpoint/2010/main" xmlns:p="http://schemas.openxmlformats.org/presentationml/2006/main" xmlns:r="http://schemas.openxmlformats.org/officeDocument/2006/relationships" xmlns:a="http://schemas.openxmlformats.org/drawingml/2006/main" xmlns="" val="2833871767"/>
       </p:ext>
     </p:extLst>
   </p:cSld>
@@ -1994,7 +1996,7 @@
             <a:fld id="{2C59F9AD-AC7D-47D0-978F-DB0960CE5219}" type="datetimeFigureOut">
               <a:rPr lang="en-US" smtClean="0"/>
               <a:pPr/>
-              <a:t>18.01.2016</a:t>
+              <a:t>29.03.2016</a:t>
             </a:fld>
             <a:endParaRPr lang="en-US"/>
           </a:p>
@@ -2046,7 +2048,7 @@
     </p:spTree>
     <p:extLst>
       <p:ext uri="{BB962C8B-B14F-4D97-AF65-F5344CB8AC3E}">
-        <p14:creationId xmlns="" xmlns:a="http://schemas.openxmlformats.org/drawingml/2006/main" xmlns:r="http://schemas.openxmlformats.org/officeDocument/2006/relationships" xmlns:p="http://schemas.openxmlformats.org/presentationml/2006/main" xmlns:p14="http://schemas.microsoft.com/office/powerpoint/2010/main" xmlns:mv="urn:schemas-microsoft-com:mac:vml" xmlns:mc="http://schemas.openxmlformats.org/markup-compatibility/2006" val="1473096845"/>
+        <p14:creationId xmlns:mc="http://schemas.openxmlformats.org/markup-compatibility/2006" xmlns:mv="urn:schemas-microsoft-com:mac:vml" xmlns:p14="http://schemas.microsoft.com/office/powerpoint/2010/main" xmlns:p="http://schemas.openxmlformats.org/presentationml/2006/main" xmlns:r="http://schemas.openxmlformats.org/officeDocument/2006/relationships" xmlns:a="http://schemas.openxmlformats.org/drawingml/2006/main" xmlns="" val="1473096845"/>
       </p:ext>
     </p:extLst>
   </p:cSld>
@@ -2273,7 +2275,7 @@
             <a:fld id="{2C59F9AD-AC7D-47D0-978F-DB0960CE5219}" type="datetimeFigureOut">
               <a:rPr lang="en-US" smtClean="0"/>
               <a:pPr/>
-              <a:t>18.01.2016</a:t>
+              <a:t>29.03.2016</a:t>
             </a:fld>
             <a:endParaRPr lang="en-US"/>
           </a:p>
@@ -2325,7 +2327,7 @@
     </p:spTree>
     <p:extLst>
       <p:ext uri="{BB962C8B-B14F-4D97-AF65-F5344CB8AC3E}">
-        <p14:creationId xmlns="" xmlns:a="http://schemas.openxmlformats.org/drawingml/2006/main" xmlns:r="http://schemas.openxmlformats.org/officeDocument/2006/relationships" xmlns:p="http://schemas.openxmlformats.org/presentationml/2006/main" xmlns:p14="http://schemas.microsoft.com/office/powerpoint/2010/main" xmlns:mv="urn:schemas-microsoft-com:mac:vml" xmlns:mc="http://schemas.openxmlformats.org/markup-compatibility/2006" val="2930352400"/>
+        <p14:creationId xmlns:mc="http://schemas.openxmlformats.org/markup-compatibility/2006" xmlns:mv="urn:schemas-microsoft-com:mac:vml" xmlns:p14="http://schemas.microsoft.com/office/powerpoint/2010/main" xmlns:p="http://schemas.openxmlformats.org/presentationml/2006/main" xmlns:r="http://schemas.openxmlformats.org/officeDocument/2006/relationships" xmlns:a="http://schemas.openxmlformats.org/drawingml/2006/main" xmlns="" val="2930352400"/>
       </p:ext>
     </p:extLst>
   </p:cSld>
@@ -2528,7 +2530,7 @@
             <a:fld id="{2C59F9AD-AC7D-47D0-978F-DB0960CE5219}" type="datetimeFigureOut">
               <a:rPr lang="en-US" smtClean="0"/>
               <a:pPr/>
-              <a:t>18.01.2016</a:t>
+              <a:t>29.03.2016</a:t>
             </a:fld>
             <a:endParaRPr lang="en-US"/>
           </a:p>
@@ -2580,7 +2582,7 @@
     </p:spTree>
     <p:extLst>
       <p:ext uri="{BB962C8B-B14F-4D97-AF65-F5344CB8AC3E}">
-        <p14:creationId xmlns="" xmlns:a="http://schemas.openxmlformats.org/drawingml/2006/main" xmlns:r="http://schemas.openxmlformats.org/officeDocument/2006/relationships" xmlns:p="http://schemas.openxmlformats.org/presentationml/2006/main" xmlns:p14="http://schemas.microsoft.com/office/powerpoint/2010/main" xmlns:mv="urn:schemas-microsoft-com:mac:vml" xmlns:mc="http://schemas.openxmlformats.org/markup-compatibility/2006" val="1228895368"/>
+        <p14:creationId xmlns:mc="http://schemas.openxmlformats.org/markup-compatibility/2006" xmlns:mv="urn:schemas-microsoft-com:mac:vml" xmlns:p14="http://schemas.microsoft.com/office/powerpoint/2010/main" xmlns:p="http://schemas.openxmlformats.org/presentationml/2006/main" xmlns:r="http://schemas.openxmlformats.org/officeDocument/2006/relationships" xmlns:a="http://schemas.openxmlformats.org/drawingml/2006/main" xmlns="" val="1228895368"/>
       </p:ext>
     </p:extLst>
   </p:cSld>
@@ -2743,7 +2745,7 @@
             <a:fld id="{2C59F9AD-AC7D-47D0-978F-DB0960CE5219}" type="datetimeFigureOut">
               <a:rPr lang="en-US" smtClean="0"/>
               <a:pPr/>
-              <a:t>18.01.2016</a:t>
+              <a:t>29.03.2016</a:t>
             </a:fld>
             <a:endParaRPr lang="en-US"/>
           </a:p>
@@ -2831,7 +2833,7 @@
     </p:spTree>
     <p:extLst>
       <p:ext uri="{BB962C8B-B14F-4D97-AF65-F5344CB8AC3E}">
-        <p14:creationId xmlns="" xmlns:a="http://schemas.openxmlformats.org/drawingml/2006/main" xmlns:r="http://schemas.openxmlformats.org/officeDocument/2006/relationships" xmlns:p="http://schemas.openxmlformats.org/presentationml/2006/main" xmlns:p14="http://schemas.microsoft.com/office/powerpoint/2010/main" xmlns:mv="urn:schemas-microsoft-com:mac:vml" xmlns:mc="http://schemas.openxmlformats.org/markup-compatibility/2006" val="675265094"/>
+        <p14:creationId xmlns:mc="http://schemas.openxmlformats.org/markup-compatibility/2006" xmlns:mv="urn:schemas-microsoft-com:mac:vml" xmlns:p14="http://schemas.microsoft.com/office/powerpoint/2010/main" xmlns:p="http://schemas.openxmlformats.org/presentationml/2006/main" xmlns:r="http://schemas.openxmlformats.org/officeDocument/2006/relationships" xmlns:a="http://schemas.openxmlformats.org/drawingml/2006/main" xmlns="" val="675265094"/>
       </p:ext>
     </p:extLst>
   </p:cSld>
@@ -3475,7 +3477,7 @@
             <a:blip r:embed="rId3">
               <a:extLst>
                 <a:ext uri="{28A0092B-C50C-407E-A947-70E740481C1C}">
-                  <a14:useLocalDpi xmlns="" xmlns:a="http://schemas.openxmlformats.org/drawingml/2006/main" xmlns:r="http://schemas.openxmlformats.org/officeDocument/2006/relationships" xmlns:p="http://schemas.openxmlformats.org/presentationml/2006/main" xmlns:a14="http://schemas.microsoft.com/office/drawing/2010/main" xmlns:mv="urn:schemas-microsoft-com:mac:vml" xmlns:mc="http://schemas.openxmlformats.org/markup-compatibility/2006" val="0"/>
+                  <a14:useLocalDpi xmlns:mc="http://schemas.openxmlformats.org/markup-compatibility/2006" xmlns:mv="urn:schemas-microsoft-com:mac:vml" xmlns:a14="http://schemas.microsoft.com/office/drawing/2010/main" xmlns:p="http://schemas.openxmlformats.org/presentationml/2006/main" xmlns:r="http://schemas.openxmlformats.org/officeDocument/2006/relationships" xmlns:a="http://schemas.openxmlformats.org/drawingml/2006/main" xmlns="" val="0"/>
                 </a:ext>
               </a:extLst>
             </a:blip>
@@ -3495,7 +3497,7 @@
             <a:noFill/>
             <a:extLst>
               <a:ext uri="{909E8E84-426E-40DD-AFC4-6F175D3DCCD1}">
-                <a14:hiddenFill xmlns="" xmlns:a="http://schemas.openxmlformats.org/drawingml/2006/main" xmlns:r="http://schemas.openxmlformats.org/officeDocument/2006/relationships" xmlns:p="http://schemas.openxmlformats.org/presentationml/2006/main" xmlns:a14="http://schemas.microsoft.com/office/drawing/2010/main" xmlns:mv="urn:schemas-microsoft-com:mac:vml" xmlns:mc="http://schemas.openxmlformats.org/markup-compatibility/2006">
+                <a14:hiddenFill xmlns:mc="http://schemas.openxmlformats.org/markup-compatibility/2006" xmlns:mv="urn:schemas-microsoft-com:mac:vml" xmlns:a14="http://schemas.microsoft.com/office/drawing/2010/main" xmlns:p="http://schemas.openxmlformats.org/presentationml/2006/main" xmlns:r="http://schemas.openxmlformats.org/officeDocument/2006/relationships" xmlns:a="http://schemas.openxmlformats.org/drawingml/2006/main" xmlns="">
                   <a:solidFill>
                     <a:srgbClr val="FFFFFF"/>
                   </a:solidFill>
@@ -3516,7 +3518,7 @@
             <a:blip r:embed="rId4">
               <a:extLst>
                 <a:ext uri="{28A0092B-C50C-407E-A947-70E740481C1C}">
-                  <a14:useLocalDpi xmlns="" xmlns:a="http://schemas.openxmlformats.org/drawingml/2006/main" xmlns:r="http://schemas.openxmlformats.org/officeDocument/2006/relationships" xmlns:p="http://schemas.openxmlformats.org/presentationml/2006/main" xmlns:a14="http://schemas.microsoft.com/office/drawing/2010/main" xmlns:mv="urn:schemas-microsoft-com:mac:vml" xmlns:mc="http://schemas.openxmlformats.org/markup-compatibility/2006" val="0"/>
+                  <a14:useLocalDpi xmlns:mc="http://schemas.openxmlformats.org/markup-compatibility/2006" xmlns:mv="urn:schemas-microsoft-com:mac:vml" xmlns:a14="http://schemas.microsoft.com/office/drawing/2010/main" xmlns:p="http://schemas.openxmlformats.org/presentationml/2006/main" xmlns:r="http://schemas.openxmlformats.org/officeDocument/2006/relationships" xmlns:a="http://schemas.openxmlformats.org/drawingml/2006/main" xmlns="" val="0"/>
                 </a:ext>
               </a:extLst>
             </a:blip>
@@ -3536,7 +3538,7 @@
             <a:noFill/>
             <a:extLst>
               <a:ext uri="{909E8E84-426E-40DD-AFC4-6F175D3DCCD1}">
-                <a14:hiddenFill xmlns="" xmlns:a="http://schemas.openxmlformats.org/drawingml/2006/main" xmlns:r="http://schemas.openxmlformats.org/officeDocument/2006/relationships" xmlns:p="http://schemas.openxmlformats.org/presentationml/2006/main" xmlns:a14="http://schemas.microsoft.com/office/drawing/2010/main" xmlns:mv="urn:schemas-microsoft-com:mac:vml" xmlns:mc="http://schemas.openxmlformats.org/markup-compatibility/2006">
+                <a14:hiddenFill xmlns:mc="http://schemas.openxmlformats.org/markup-compatibility/2006" xmlns:mv="urn:schemas-microsoft-com:mac:vml" xmlns:a14="http://schemas.microsoft.com/office/drawing/2010/main" xmlns:p="http://schemas.openxmlformats.org/presentationml/2006/main" xmlns:r="http://schemas.openxmlformats.org/officeDocument/2006/relationships" xmlns:a="http://schemas.openxmlformats.org/drawingml/2006/main" xmlns="">
                   <a:solidFill>
                     <a:srgbClr val="FFFFFF"/>
                   </a:solidFill>
@@ -3689,7 +3691,7 @@
             <a:blip r:embed="rId3">
               <a:extLst>
                 <a:ext uri="{28A0092B-C50C-407E-A947-70E740481C1C}">
-                  <a14:useLocalDpi xmlns="" xmlns:a="http://schemas.openxmlformats.org/drawingml/2006/main" xmlns:r="http://schemas.openxmlformats.org/officeDocument/2006/relationships" xmlns:p="http://schemas.openxmlformats.org/presentationml/2006/main" xmlns:a14="http://schemas.microsoft.com/office/drawing/2010/main" xmlns:mv="urn:schemas-microsoft-com:mac:vml" xmlns:mc="http://schemas.openxmlformats.org/markup-compatibility/2006" val="0"/>
+                  <a14:useLocalDpi xmlns:mc="http://schemas.openxmlformats.org/markup-compatibility/2006" xmlns:mv="urn:schemas-microsoft-com:mac:vml" xmlns:a14="http://schemas.microsoft.com/office/drawing/2010/main" xmlns:p="http://schemas.openxmlformats.org/presentationml/2006/main" xmlns:r="http://schemas.openxmlformats.org/officeDocument/2006/relationships" xmlns:a="http://schemas.openxmlformats.org/drawingml/2006/main" xmlns="" val="0"/>
                 </a:ext>
               </a:extLst>
             </a:blip>
@@ -3709,7 +3711,7 @@
             <a:noFill/>
             <a:extLst>
               <a:ext uri="{909E8E84-426E-40DD-AFC4-6F175D3DCCD1}">
-                <a14:hiddenFill xmlns="" xmlns:a="http://schemas.openxmlformats.org/drawingml/2006/main" xmlns:r="http://schemas.openxmlformats.org/officeDocument/2006/relationships" xmlns:p="http://schemas.openxmlformats.org/presentationml/2006/main" xmlns:a14="http://schemas.microsoft.com/office/drawing/2010/main" xmlns:mv="urn:schemas-microsoft-com:mac:vml" xmlns:mc="http://schemas.openxmlformats.org/markup-compatibility/2006">
+                <a14:hiddenFill xmlns:mc="http://schemas.openxmlformats.org/markup-compatibility/2006" xmlns:mv="urn:schemas-microsoft-com:mac:vml" xmlns:a14="http://schemas.microsoft.com/office/drawing/2010/main" xmlns:p="http://schemas.openxmlformats.org/presentationml/2006/main" xmlns:r="http://schemas.openxmlformats.org/officeDocument/2006/relationships" xmlns:a="http://schemas.openxmlformats.org/drawingml/2006/main" xmlns="">
                   <a:solidFill>
                     <a:srgbClr val="FFFFFF"/>
                   </a:solidFill>
@@ -3818,7 +3820,7 @@
             <a:blip r:embed="rId3">
               <a:extLst>
                 <a:ext uri="{28A0092B-C50C-407E-A947-70E740481C1C}">
-                  <a14:useLocalDpi xmlns="" xmlns:a="http://schemas.openxmlformats.org/drawingml/2006/main" xmlns:r="http://schemas.openxmlformats.org/officeDocument/2006/relationships" xmlns:p="http://schemas.openxmlformats.org/presentationml/2006/main" xmlns:a14="http://schemas.microsoft.com/office/drawing/2010/main" xmlns:mv="urn:schemas-microsoft-com:mac:vml" xmlns:mc="http://schemas.openxmlformats.org/markup-compatibility/2006" val="0"/>
+                  <a14:useLocalDpi xmlns:mc="http://schemas.openxmlformats.org/markup-compatibility/2006" xmlns:mv="urn:schemas-microsoft-com:mac:vml" xmlns:a14="http://schemas.microsoft.com/office/drawing/2010/main" xmlns:p="http://schemas.openxmlformats.org/presentationml/2006/main" xmlns:r="http://schemas.openxmlformats.org/officeDocument/2006/relationships" xmlns:a="http://schemas.openxmlformats.org/drawingml/2006/main" xmlns="" val="0"/>
                 </a:ext>
               </a:extLst>
             </a:blip>
@@ -3838,7 +3840,7 @@
             <a:noFill/>
             <a:extLst>
               <a:ext uri="{909E8E84-426E-40DD-AFC4-6F175D3DCCD1}">
-                <a14:hiddenFill xmlns="" xmlns:a="http://schemas.openxmlformats.org/drawingml/2006/main" xmlns:r="http://schemas.openxmlformats.org/officeDocument/2006/relationships" xmlns:p="http://schemas.openxmlformats.org/presentationml/2006/main" xmlns:a14="http://schemas.microsoft.com/office/drawing/2010/main" xmlns:mv="urn:schemas-microsoft-com:mac:vml" xmlns:mc="http://schemas.openxmlformats.org/markup-compatibility/2006">
+                <a14:hiddenFill xmlns:mc="http://schemas.openxmlformats.org/markup-compatibility/2006" xmlns:mv="urn:schemas-microsoft-com:mac:vml" xmlns:a14="http://schemas.microsoft.com/office/drawing/2010/main" xmlns:p="http://schemas.openxmlformats.org/presentationml/2006/main" xmlns:r="http://schemas.openxmlformats.org/officeDocument/2006/relationships" xmlns:a="http://schemas.openxmlformats.org/drawingml/2006/main" xmlns="">
                   <a:solidFill>
                     <a:srgbClr val="FFFFFF"/>
                   </a:solidFill>
@@ -3962,7 +3964,1247 @@
     </p:spTree>
     <p:extLst>
       <p:ext uri="{BB962C8B-B14F-4D97-AF65-F5344CB8AC3E}">
-        <p14:creationId xmlns="" xmlns:a="http://schemas.openxmlformats.org/drawingml/2006/main" xmlns:r="http://schemas.openxmlformats.org/officeDocument/2006/relationships" xmlns:p="http://schemas.openxmlformats.org/presentationml/2006/main" xmlns:p14="http://schemas.microsoft.com/office/powerpoint/2010/main" xmlns:mv="urn:schemas-microsoft-com:mac:vml" xmlns:mc="http://schemas.openxmlformats.org/markup-compatibility/2006" val="2580360701"/>
+        <p14:creationId xmlns:mc="http://schemas.openxmlformats.org/markup-compatibility/2006" xmlns:mv="urn:schemas-microsoft-com:mac:vml" xmlns:p14="http://schemas.microsoft.com/office/powerpoint/2010/main" xmlns:p="http://schemas.openxmlformats.org/presentationml/2006/main" xmlns:r="http://schemas.openxmlformats.org/officeDocument/2006/relationships" xmlns:a="http://schemas.openxmlformats.org/drawingml/2006/main" xmlns="" val="2580360701"/>
+      </p:ext>
+    </p:extLst>
+  </p:cSld>
+  <p:clrMapOvr>
+    <a:masterClrMapping/>
+  </p:clrMapOvr>
+</p:sld>
+</file>
+
+<file path=ppt/slides/slide2.xml><?xml version="1.0" encoding="utf-8"?>
+<p:sld xmlns:a="http://schemas.openxmlformats.org/drawingml/2006/main" xmlns:r="http://schemas.openxmlformats.org/officeDocument/2006/relationships" xmlns:mc="http://schemas.openxmlformats.org/markup-compatibility/2006" xmlns:mv="urn:schemas-microsoft-com:mac:vml" xmlns:p="http://schemas.openxmlformats.org/presentationml/2006/main" mc:Ignorable="mv" mc:PreserveAttributes="mv:*">
+  <p:cSld>
+    <p:spTree>
+      <p:nvGrpSpPr>
+        <p:cNvPr id="1" name=""/>
+        <p:cNvGrpSpPr/>
+        <p:nvPr/>
+      </p:nvGrpSpPr>
+      <p:grpSpPr>
+        <a:xfrm>
+          <a:off x="0" y="0"/>
+          <a:ext cx="0" cy="0"/>
+          <a:chOff x="0" y="0"/>
+          <a:chExt cx="0" cy="0"/>
+        </a:xfrm>
+      </p:grpSpPr>
+      <p:grpSp>
+        <p:nvGrpSpPr>
+          <p:cNvPr id="40" name="Gruppierung 39"/>
+          <p:cNvGrpSpPr/>
+          <p:nvPr/>
+        </p:nvGrpSpPr>
+        <p:grpSpPr>
+          <a:xfrm>
+            <a:off x="507294" y="914400"/>
+            <a:ext cx="8169162" cy="4038600"/>
+            <a:chOff x="507294" y="914400"/>
+            <a:chExt cx="8169162" cy="4038600"/>
+          </a:xfrm>
+        </p:grpSpPr>
+        <p:sp>
+          <p:nvSpPr>
+            <p:cNvPr id="54" name="Rectangle à coins arrondis 6"/>
+            <p:cNvSpPr/>
+            <p:nvPr/>
+          </p:nvSpPr>
+          <p:spPr>
+            <a:xfrm>
+              <a:off x="1219200" y="2667000"/>
+              <a:ext cx="6553200" cy="304800"/>
+            </a:xfrm>
+            <a:prstGeom prst="roundRect">
+              <a:avLst/>
+            </a:prstGeom>
+            <a:solidFill>
+              <a:schemeClr val="tx2">
+                <a:lumMod val="20000"/>
+                <a:lumOff val="80000"/>
+              </a:schemeClr>
+            </a:solidFill>
+            <a:ln>
+              <a:noFill/>
+            </a:ln>
+            <a:effectLst>
+              <a:outerShdw blurRad="44450" dist="27940" dir="5400000" algn="ctr">
+                <a:srgbClr val="000000">
+                  <a:alpha val="32000"/>
+                </a:srgbClr>
+              </a:outerShdw>
+            </a:effectLst>
+            <a:scene3d>
+              <a:camera prst="orthographicFront">
+                <a:rot lat="0" lon="0" rev="0"/>
+              </a:camera>
+              <a:lightRig rig="balanced" dir="t">
+                <a:rot lat="0" lon="0" rev="8700000"/>
+              </a:lightRig>
+            </a:scene3d>
+            <a:sp3d>
+              <a:bevelT w="190500" h="38100"/>
+            </a:sp3d>
+          </p:spPr>
+          <p:style>
+            <a:lnRef idx="2">
+              <a:schemeClr val="accent1">
+                <a:shade val="50000"/>
+              </a:schemeClr>
+            </a:lnRef>
+            <a:fillRef idx="1">
+              <a:schemeClr val="accent1"/>
+            </a:fillRef>
+            <a:effectRef idx="0">
+              <a:schemeClr val="accent1"/>
+            </a:effectRef>
+            <a:fontRef idx="minor">
+              <a:schemeClr val="lt1"/>
+            </a:fontRef>
+          </p:style>
+          <p:txBody>
+            <a:bodyPr rtlCol="0" anchor="ctr"/>
+            <a:lstStyle/>
+            <a:p>
+              <a:pPr algn="ctr"/>
+              <a:r>
+                <a:rPr lang="fr-FR" dirty="0" smtClean="0"/>
+                <a:t>Firewall</a:t>
+              </a:r>
+              <a:endParaRPr lang="en-US" dirty="0"/>
+            </a:p>
+          </p:txBody>
+        </p:sp>
+        <p:sp>
+          <p:nvSpPr>
+            <p:cNvPr id="4" name="Rectangle 3"/>
+            <p:cNvSpPr/>
+            <p:nvPr/>
+          </p:nvSpPr>
+          <p:spPr>
+            <a:xfrm>
+              <a:off x="507294" y="3340515"/>
+              <a:ext cx="8169162" cy="1612485"/>
+            </a:xfrm>
+            <a:prstGeom prst="rect">
+              <a:avLst/>
+            </a:prstGeom>
+          </p:spPr>
+          <p:style>
+            <a:lnRef idx="2">
+              <a:schemeClr val="accent1">
+                <a:shade val="50000"/>
+              </a:schemeClr>
+            </a:lnRef>
+            <a:fillRef idx="1">
+              <a:schemeClr val="accent1"/>
+            </a:fillRef>
+            <a:effectRef idx="0">
+              <a:schemeClr val="accent1"/>
+            </a:effectRef>
+            <a:fontRef idx="minor">
+              <a:schemeClr val="lt1"/>
+            </a:fontRef>
+          </p:style>
+          <p:txBody>
+            <a:bodyPr rtlCol="0" anchor="b" anchorCtr="1"/>
+            <a:lstStyle/>
+            <a:p>
+              <a:r>
+                <a:rPr lang="fr-FR" dirty="0" smtClean="0"/>
+                <a:t>rethink-</a:t>
+              </a:r>
+              <a:r>
+                <a:rPr lang="fr-FR" dirty="0" smtClean="0"/>
+                <a:t>node-00.</a:t>
+              </a:r>
+              <a:r>
+                <a:rPr lang="fr-FR" dirty="0" smtClean="0"/>
+                <a:t>fokus.fraunhofer.de   </a:t>
+              </a:r>
+              <a:r>
+                <a:rPr lang="fr-FR" dirty="0" smtClean="0"/>
+                <a:t>      </a:t>
+              </a:r>
+              <a:r>
+                <a:rPr lang="de-DE" dirty="0" smtClean="0"/>
+                <a:t>193.175.132.178</a:t>
+              </a:r>
+              <a:endParaRPr lang="en-US" dirty="0"/>
+            </a:p>
+          </p:txBody>
+        </p:sp>
+        <p:sp>
+          <p:nvSpPr>
+            <p:cNvPr id="7" name="Rectangle à coins arrondis 6"/>
+            <p:cNvSpPr/>
+            <p:nvPr/>
+          </p:nvSpPr>
+          <p:spPr>
+            <a:xfrm>
+              <a:off x="606310" y="3733800"/>
+              <a:ext cx="8004290" cy="504056"/>
+            </a:xfrm>
+            <a:prstGeom prst="roundRect">
+              <a:avLst/>
+            </a:prstGeom>
+            <a:solidFill>
+              <a:schemeClr val="tx2">
+                <a:lumMod val="20000"/>
+                <a:lumOff val="80000"/>
+              </a:schemeClr>
+            </a:solidFill>
+            <a:ln>
+              <a:noFill/>
+            </a:ln>
+            <a:effectLst>
+              <a:outerShdw blurRad="44450" dist="27940" dir="5400000" algn="ctr">
+                <a:srgbClr val="000000">
+                  <a:alpha val="32000"/>
+                </a:srgbClr>
+              </a:outerShdw>
+            </a:effectLst>
+            <a:scene3d>
+              <a:camera prst="orthographicFront">
+                <a:rot lat="0" lon="0" rev="0"/>
+              </a:camera>
+              <a:lightRig rig="balanced" dir="t">
+                <a:rot lat="0" lon="0" rev="8700000"/>
+              </a:lightRig>
+            </a:scene3d>
+            <a:sp3d>
+              <a:bevelT w="190500" h="38100"/>
+            </a:sp3d>
+          </p:spPr>
+          <p:style>
+            <a:lnRef idx="2">
+              <a:schemeClr val="accent1">
+                <a:shade val="50000"/>
+              </a:schemeClr>
+            </a:lnRef>
+            <a:fillRef idx="1">
+              <a:schemeClr val="accent1"/>
+            </a:fillRef>
+            <a:effectRef idx="0">
+              <a:schemeClr val="accent1"/>
+            </a:effectRef>
+            <a:fontRef idx="minor">
+              <a:schemeClr val="lt1"/>
+            </a:fontRef>
+          </p:style>
+          <p:txBody>
+            <a:bodyPr rtlCol="0" anchor="ctr"/>
+            <a:lstStyle/>
+            <a:p>
+              <a:pPr algn="ctr"/>
+              <a:r>
+                <a:rPr lang="fr-FR" dirty="0" smtClean="0"/>
+                <a:t>reverse-proxy</a:t>
+              </a:r>
+              <a:endParaRPr lang="en-US" dirty="0"/>
+            </a:p>
+          </p:txBody>
+        </p:sp>
+        <p:sp>
+          <p:nvSpPr>
+            <p:cNvPr id="34" name="Rectangle 33"/>
+            <p:cNvSpPr/>
+            <p:nvPr/>
+          </p:nvSpPr>
+          <p:spPr>
+            <a:xfrm>
+              <a:off x="2667000" y="914400"/>
+              <a:ext cx="3659976" cy="1169551"/>
+            </a:xfrm>
+            <a:prstGeom prst="rect">
+              <a:avLst/>
+            </a:prstGeom>
+          </p:spPr>
+          <p:txBody>
+            <a:bodyPr wrap="none">
+              <a:spAutoFit/>
+            </a:bodyPr>
+            <a:lstStyle/>
+            <a:p>
+              <a:r>
+                <a:rPr lang="fr-FR" sz="1400" dirty="0" err="1" smtClean="0">
+                  <a:solidFill>
+                    <a:srgbClr val="0000FF"/>
+                  </a:solidFill>
+                </a:rPr>
+                <a:t>rethink-rproxy.fokus.fraunhofer.de</a:t>
+              </a:r>
+              <a:endParaRPr lang="fr-FR" sz="1400" dirty="0" smtClean="0">
+                <a:solidFill>
+                  <a:srgbClr val="0000FF"/>
+                </a:solidFill>
+              </a:endParaRPr>
+            </a:p>
+            <a:p>
+              <a:r>
+                <a:rPr lang="fr-FR" sz="1400" dirty="0" smtClean="0"/>
+                <a:t>rethink-node-00</a:t>
+              </a:r>
+              <a:r>
+                <a:rPr lang="fr-FR" sz="1400" dirty="0" smtClean="0"/>
+                <a:t>.fokus.fraunhofer.de</a:t>
+              </a:r>
+              <a:endParaRPr lang="fr-FR" sz="1400" dirty="0" smtClean="0"/>
+            </a:p>
+            <a:p>
+              <a:r>
+                <a:rPr lang="fr-FR" sz="1400" dirty="0" err="1" smtClean="0"/>
+                <a:t>rproxy-rethink.fokus.fraunhofer.de</a:t>
+              </a:r>
+              <a:endParaRPr lang="fr-FR" sz="1400" dirty="0" smtClean="0"/>
+            </a:p>
+            <a:p>
+              <a:r>
+                <a:rPr lang="en-GB" sz="1400" dirty="0" smtClean="0"/>
+                <a:t>catalogue-</a:t>
+              </a:r>
+              <a:r>
+                <a:rPr lang="en-GB" sz="1400" dirty="0" smtClean="0"/>
+                <a:t>rethink</a:t>
+              </a:r>
+              <a:r>
+                <a:rPr lang="fr-FR" sz="1400" dirty="0" smtClean="0"/>
+                <a:t>.</a:t>
+              </a:r>
+              <a:r>
+                <a:rPr lang="fr-FR" sz="1400" dirty="0" err="1" smtClean="0"/>
+                <a:t>fokus.fraunhofer.de</a:t>
+              </a:r>
+              <a:endParaRPr lang="de-DE" sz="1400" dirty="0" smtClean="0"/>
+            </a:p>
+            <a:p>
+              <a:r>
+                <a:rPr lang="en-GB" sz="1400" dirty="0" smtClean="0"/>
+                <a:t>catalogue-</a:t>
+              </a:r>
+              <a:r>
+                <a:rPr lang="en-GB" sz="1400" dirty="0" err="1" smtClean="0"/>
+                <a:t>testpage</a:t>
+              </a:r>
+              <a:r>
+                <a:rPr lang="en-GB" sz="1400" dirty="0" smtClean="0"/>
+                <a:t>-</a:t>
+              </a:r>
+              <a:r>
+                <a:rPr lang="en-GB" sz="1400" dirty="0" smtClean="0"/>
+                <a:t>rethink</a:t>
+              </a:r>
+              <a:r>
+                <a:rPr lang="fr-FR" sz="1400" dirty="0" smtClean="0"/>
+                <a:t>.</a:t>
+              </a:r>
+              <a:r>
+                <a:rPr lang="fr-FR" sz="1400" dirty="0" err="1" smtClean="0"/>
+                <a:t>fokus.fraunhofer.de</a:t>
+              </a:r>
+              <a:endParaRPr lang="en-US" sz="1400" dirty="0"/>
+            </a:p>
+          </p:txBody>
+        </p:sp>
+        <p:cxnSp>
+          <p:nvCxnSpPr>
+            <p:cNvPr id="33" name="Gerade Verbindung mit Pfeil 32"/>
+            <p:cNvCxnSpPr/>
+            <p:nvPr/>
+          </p:nvCxnSpPr>
+          <p:spPr>
+            <a:xfrm rot="5400000">
+              <a:off x="2247900" y="2857500"/>
+              <a:ext cx="1447800" cy="1588"/>
+            </a:xfrm>
+            <a:prstGeom prst="straightConnector1">
+              <a:avLst/>
+            </a:prstGeom>
+            <a:ln>
+              <a:solidFill>
+                <a:schemeClr val="tx1"/>
+              </a:solidFill>
+              <a:tailEnd type="arrow"/>
+            </a:ln>
+          </p:spPr>
+          <p:style>
+            <a:lnRef idx="2">
+              <a:schemeClr val="accent1"/>
+            </a:lnRef>
+            <a:fillRef idx="0">
+              <a:schemeClr val="accent1"/>
+            </a:fillRef>
+            <a:effectRef idx="1">
+              <a:schemeClr val="accent1"/>
+            </a:effectRef>
+            <a:fontRef idx="minor">
+              <a:schemeClr val="tx1"/>
+            </a:fontRef>
+          </p:style>
+        </p:cxnSp>
+        <p:cxnSp>
+          <p:nvCxnSpPr>
+            <p:cNvPr id="35" name="Gerade Verbindung mit Pfeil 34"/>
+            <p:cNvCxnSpPr/>
+            <p:nvPr/>
+          </p:nvCxnSpPr>
+          <p:spPr>
+            <a:xfrm rot="5400000">
+              <a:off x="2858294" y="2856706"/>
+              <a:ext cx="1447800" cy="1588"/>
+            </a:xfrm>
+            <a:prstGeom prst="straightConnector1">
+              <a:avLst/>
+            </a:prstGeom>
+            <a:ln>
+              <a:solidFill>
+                <a:schemeClr val="tx1"/>
+              </a:solidFill>
+              <a:tailEnd type="arrow"/>
+            </a:ln>
+          </p:spPr>
+          <p:style>
+            <a:lnRef idx="2">
+              <a:schemeClr val="accent1"/>
+            </a:lnRef>
+            <a:fillRef idx="0">
+              <a:schemeClr val="accent1"/>
+            </a:fillRef>
+            <a:effectRef idx="1">
+              <a:schemeClr val="accent1"/>
+            </a:effectRef>
+            <a:fontRef idx="minor">
+              <a:schemeClr val="tx1"/>
+            </a:fontRef>
+          </p:style>
+        </p:cxnSp>
+        <p:cxnSp>
+          <p:nvCxnSpPr>
+            <p:cNvPr id="37" name="Gerade Verbindung mit Pfeil 36"/>
+            <p:cNvCxnSpPr/>
+            <p:nvPr/>
+          </p:nvCxnSpPr>
+          <p:spPr>
+            <a:xfrm rot="5400000">
+              <a:off x="4533900" y="2857500"/>
+              <a:ext cx="1447800" cy="1588"/>
+            </a:xfrm>
+            <a:prstGeom prst="straightConnector1">
+              <a:avLst/>
+            </a:prstGeom>
+            <a:ln>
+              <a:solidFill>
+                <a:schemeClr val="tx1"/>
+              </a:solidFill>
+              <a:tailEnd type="arrow"/>
+            </a:ln>
+          </p:spPr>
+          <p:style>
+            <a:lnRef idx="2">
+              <a:schemeClr val="accent1"/>
+            </a:lnRef>
+            <a:fillRef idx="0">
+              <a:schemeClr val="accent1"/>
+            </a:fillRef>
+            <a:effectRef idx="1">
+              <a:schemeClr val="accent1"/>
+            </a:effectRef>
+            <a:fontRef idx="minor">
+              <a:schemeClr val="tx1"/>
+            </a:fontRef>
+          </p:style>
+        </p:cxnSp>
+        <p:cxnSp>
+          <p:nvCxnSpPr>
+            <p:cNvPr id="38" name="Gerade Verbindung mit Pfeil 37"/>
+            <p:cNvCxnSpPr/>
+            <p:nvPr/>
+          </p:nvCxnSpPr>
+          <p:spPr>
+            <a:xfrm rot="5400000">
+              <a:off x="5144294" y="2856706"/>
+              <a:ext cx="1447800" cy="1588"/>
+            </a:xfrm>
+            <a:prstGeom prst="straightConnector1">
+              <a:avLst/>
+            </a:prstGeom>
+            <a:ln>
+              <a:solidFill>
+                <a:schemeClr val="tx1"/>
+              </a:solidFill>
+              <a:tailEnd type="arrow"/>
+            </a:ln>
+          </p:spPr>
+          <p:style>
+            <a:lnRef idx="2">
+              <a:schemeClr val="accent1"/>
+            </a:lnRef>
+            <a:fillRef idx="0">
+              <a:schemeClr val="accent1"/>
+            </a:fillRef>
+            <a:effectRef idx="1">
+              <a:schemeClr val="accent1"/>
+            </a:effectRef>
+            <a:fontRef idx="minor">
+              <a:schemeClr val="tx1"/>
+            </a:fontRef>
+          </p:style>
+        </p:cxnSp>
+      </p:grpSp>
+    </p:spTree>
+    <p:extLst>
+      <p:ext uri="{BB962C8B-B14F-4D97-AF65-F5344CB8AC3E}">
+        <p14:creationId xmlns:mc="http://schemas.openxmlformats.org/markup-compatibility/2006" xmlns:mv="urn:schemas-microsoft-com:mac:vml" xmlns:p14="http://schemas.microsoft.com/office/powerpoint/2010/main" xmlns:p="http://schemas.openxmlformats.org/presentationml/2006/main" xmlns:r="http://schemas.openxmlformats.org/officeDocument/2006/relationships" xmlns:a="http://schemas.openxmlformats.org/drawingml/2006/main" xmlns="" val="2580360701"/>
+      </p:ext>
+    </p:extLst>
+  </p:cSld>
+  <p:clrMapOvr>
+    <a:masterClrMapping/>
+  </p:clrMapOvr>
+</p:sld>
+</file>
+
+<file path=ppt/slides/slide3.xml><?xml version="1.0" encoding="utf-8"?>
+<p:sld xmlns:a="http://schemas.openxmlformats.org/drawingml/2006/main" xmlns:r="http://schemas.openxmlformats.org/officeDocument/2006/relationships" xmlns:mc="http://schemas.openxmlformats.org/markup-compatibility/2006" xmlns:mv="urn:schemas-microsoft-com:mac:vml" xmlns:p="http://schemas.openxmlformats.org/presentationml/2006/main" mc:Ignorable="mv" mc:PreserveAttributes="mv:*">
+  <p:cSld>
+    <p:spTree>
+      <p:nvGrpSpPr>
+        <p:cNvPr id="1" name=""/>
+        <p:cNvGrpSpPr/>
+        <p:nvPr/>
+      </p:nvGrpSpPr>
+      <p:grpSpPr>
+        <a:xfrm>
+          <a:off x="0" y="0"/>
+          <a:ext cx="0" cy="0"/>
+          <a:chOff x="0" y="0"/>
+          <a:chExt cx="0" cy="0"/>
+        </a:xfrm>
+      </p:grpSpPr>
+      <p:sp>
+        <p:nvSpPr>
+          <p:cNvPr id="4" name="Rectangle 3"/>
+          <p:cNvSpPr/>
+          <p:nvPr/>
+        </p:nvSpPr>
+        <p:spPr>
+          <a:xfrm>
+            <a:off x="507294" y="3304456"/>
+            <a:ext cx="8169162" cy="2639144"/>
+          </a:xfrm>
+          <a:prstGeom prst="rect">
+            <a:avLst/>
+          </a:prstGeom>
+        </p:spPr>
+        <p:style>
+          <a:lnRef idx="2">
+            <a:schemeClr val="accent1">
+              <a:shade val="50000"/>
+            </a:schemeClr>
+          </a:lnRef>
+          <a:fillRef idx="1">
+            <a:schemeClr val="accent1"/>
+          </a:fillRef>
+          <a:effectRef idx="0">
+            <a:schemeClr val="accent1"/>
+          </a:effectRef>
+          <a:fontRef idx="minor">
+            <a:schemeClr val="lt1"/>
+          </a:fontRef>
+        </p:style>
+        <p:txBody>
+          <a:bodyPr rtlCol="0" anchor="b" anchorCtr="1"/>
+          <a:lstStyle/>
+          <a:p>
+            <a:r>
+              <a:rPr lang="fr-FR" dirty="0" err="1" smtClean="0"/>
+              <a:t>rethink-node.fokus.fraunhofer.de</a:t>
+            </a:r>
+            <a:r>
+              <a:rPr lang="fr-FR" dirty="0" smtClean="0"/>
+              <a:t>    </a:t>
+            </a:r>
+            <a:r>
+              <a:rPr lang="de-DE" dirty="0" smtClean="0"/>
+              <a:t>193.175.132.174</a:t>
+            </a:r>
+            <a:endParaRPr lang="en-US" dirty="0"/>
+          </a:p>
+        </p:txBody>
+      </p:sp>
+      <p:sp>
+        <p:nvSpPr>
+          <p:cNvPr id="9" name="Rectangle 8"/>
+          <p:cNvSpPr/>
+          <p:nvPr/>
+        </p:nvSpPr>
+        <p:spPr>
+          <a:xfrm>
+            <a:off x="528150" y="3581400"/>
+            <a:ext cx="8004290" cy="1862945"/>
+          </a:xfrm>
+          <a:prstGeom prst="rect">
+            <a:avLst/>
+          </a:prstGeom>
+          <a:solidFill>
+            <a:schemeClr val="accent1">
+              <a:lumMod val="40000"/>
+              <a:lumOff val="60000"/>
+            </a:schemeClr>
+          </a:solidFill>
+        </p:spPr>
+        <p:style>
+          <a:lnRef idx="2">
+            <a:schemeClr val="accent1">
+              <a:shade val="50000"/>
+            </a:schemeClr>
+          </a:lnRef>
+          <a:fillRef idx="1">
+            <a:schemeClr val="accent1"/>
+          </a:fillRef>
+          <a:effectRef idx="0">
+            <a:schemeClr val="accent1"/>
+          </a:effectRef>
+          <a:fontRef idx="minor">
+            <a:schemeClr val="lt1"/>
+          </a:fontRef>
+        </p:style>
+        <p:txBody>
+          <a:bodyPr rtlCol="0" anchor="ctr"/>
+          <a:lstStyle/>
+          <a:p>
+            <a:pPr algn="ctr"/>
+            <a:endParaRPr lang="en-US"/>
+          </a:p>
+        </p:txBody>
+      </p:sp>
+      <p:pic>
+        <p:nvPicPr>
+          <p:cNvPr id="10" name="Picture 2" descr="https://www.docker.com/sites/default/files/container_1.png"/>
+          <p:cNvPicPr>
+            <a:picLocks noChangeAspect="1" noChangeArrowheads="1"/>
+          </p:cNvPicPr>
+          <p:nvPr/>
+        </p:nvPicPr>
+        <p:blipFill>
+          <a:blip r:embed="rId2">
+            <a:extLst>
+              <a:ext uri="{28A0092B-C50C-407E-A947-70E740481C1C}">
+                <a14:useLocalDpi xmlns:mc="http://schemas.openxmlformats.org/markup-compatibility/2006" xmlns:mv="urn:schemas-microsoft-com:mac:vml" xmlns:a14="http://schemas.microsoft.com/office/drawing/2010/main" xmlns:p="http://schemas.openxmlformats.org/presentationml/2006/main" xmlns:r="http://schemas.openxmlformats.org/officeDocument/2006/relationships" xmlns:a="http://schemas.openxmlformats.org/drawingml/2006/main" xmlns="" val="0"/>
+              </a:ext>
+            </a:extLst>
+          </a:blip>
+          <a:srcRect/>
+          <a:stretch>
+            <a:fillRect/>
+          </a:stretch>
+        </p:blipFill>
+        <p:spPr bwMode="auto">
+          <a:xfrm>
+            <a:off x="362456" y="4359565"/>
+            <a:ext cx="1771144" cy="1126835"/>
+          </a:xfrm>
+          <a:prstGeom prst="rect">
+            <a:avLst/>
+          </a:prstGeom>
+          <a:noFill/>
+          <a:extLst>
+            <a:ext uri="{909E8E84-426E-40DD-AFC4-6F175D3DCCD1}">
+              <a14:hiddenFill xmlns:mc="http://schemas.openxmlformats.org/markup-compatibility/2006" xmlns:mv="urn:schemas-microsoft-com:mac:vml" xmlns:a14="http://schemas.microsoft.com/office/drawing/2010/main" xmlns:p="http://schemas.openxmlformats.org/presentationml/2006/main" xmlns:r="http://schemas.openxmlformats.org/officeDocument/2006/relationships" xmlns:a="http://schemas.openxmlformats.org/drawingml/2006/main" xmlns="">
+                <a:solidFill>
+                  <a:srgbClr val="FFFFFF"/>
+                </a:solidFill>
+              </a14:hiddenFill>
+            </a:ext>
+          </a:extLst>
+        </p:spPr>
+      </p:pic>
+      <p:pic>
+        <p:nvPicPr>
+          <p:cNvPr id="13" name="Picture 4" descr="https://www.docker.com/sites/all/themes/docker/assets/images/logo.png"/>
+          <p:cNvPicPr>
+            <a:picLocks noChangeAspect="1" noChangeArrowheads="1"/>
+          </p:cNvPicPr>
+          <p:nvPr/>
+        </p:nvPicPr>
+        <p:blipFill>
+          <a:blip r:embed="rId3">
+            <a:extLst>
+              <a:ext uri="{28A0092B-C50C-407E-A947-70E740481C1C}">
+                <a14:useLocalDpi xmlns:mc="http://schemas.openxmlformats.org/markup-compatibility/2006" xmlns:mv="urn:schemas-microsoft-com:mac:vml" xmlns:a14="http://schemas.microsoft.com/office/drawing/2010/main" xmlns:p="http://schemas.openxmlformats.org/presentationml/2006/main" xmlns:r="http://schemas.openxmlformats.org/officeDocument/2006/relationships" xmlns:a="http://schemas.openxmlformats.org/drawingml/2006/main" xmlns="" val="0"/>
+              </a:ext>
+            </a:extLst>
+          </a:blip>
+          <a:srcRect/>
+          <a:stretch>
+            <a:fillRect/>
+          </a:stretch>
+        </p:blipFill>
+        <p:spPr bwMode="auto">
+          <a:xfrm>
+            <a:off x="512313" y="3542184"/>
+            <a:ext cx="2190321" cy="536198"/>
+          </a:xfrm>
+          <a:prstGeom prst="rect">
+            <a:avLst/>
+          </a:prstGeom>
+          <a:noFill/>
+          <a:extLst>
+            <a:ext uri="{909E8E84-426E-40DD-AFC4-6F175D3DCCD1}">
+              <a14:hiddenFill xmlns:mc="http://schemas.openxmlformats.org/markup-compatibility/2006" xmlns:mv="urn:schemas-microsoft-com:mac:vml" xmlns:a14="http://schemas.microsoft.com/office/drawing/2010/main" xmlns:p="http://schemas.openxmlformats.org/presentationml/2006/main" xmlns:r="http://schemas.openxmlformats.org/officeDocument/2006/relationships" xmlns:a="http://schemas.openxmlformats.org/drawingml/2006/main" xmlns="">
+                <a:solidFill>
+                  <a:srgbClr val="FFFFFF"/>
+                </a:solidFill>
+              </a14:hiddenFill>
+            </a:ext>
+          </a:extLst>
+        </p:spPr>
+      </p:pic>
+      <p:sp>
+        <p:nvSpPr>
+          <p:cNvPr id="42" name="Rectangle 41"/>
+          <p:cNvSpPr/>
+          <p:nvPr/>
+        </p:nvSpPr>
+        <p:spPr>
+          <a:xfrm>
+            <a:off x="723365" y="4415543"/>
+            <a:ext cx="1257835" cy="584776"/>
+          </a:xfrm>
+          <a:prstGeom prst="rect">
+            <a:avLst/>
+          </a:prstGeom>
+        </p:spPr>
+        <p:txBody>
+          <a:bodyPr wrap="square">
+            <a:spAutoFit/>
+          </a:bodyPr>
+          <a:lstStyle/>
+          <a:p>
+            <a:r>
+              <a:rPr lang="fr-FR" sz="1600" dirty="0" smtClean="0"/>
+              <a:t>Catalogue Broker</a:t>
+            </a:r>
+            <a:endParaRPr lang="fr-FR" sz="1600" dirty="0" smtClean="0">
+              <a:solidFill>
+                <a:srgbClr val="0000FF"/>
+              </a:solidFill>
+            </a:endParaRPr>
+          </a:p>
+        </p:txBody>
+      </p:sp>
+      <p:pic>
+        <p:nvPicPr>
+          <p:cNvPr id="52" name="Picture 2" descr="https://www.docker.com/sites/default/files/container_1.png"/>
+          <p:cNvPicPr>
+            <a:picLocks noChangeAspect="1" noChangeArrowheads="1"/>
+          </p:cNvPicPr>
+          <p:nvPr/>
+        </p:nvPicPr>
+        <p:blipFill>
+          <a:blip r:embed="rId2">
+            <a:extLst>
+              <a:ext uri="{28A0092B-C50C-407E-A947-70E740481C1C}">
+                <a14:useLocalDpi xmlns:mc="http://schemas.openxmlformats.org/markup-compatibility/2006" xmlns:mv="urn:schemas-microsoft-com:mac:vml" xmlns:a14="http://schemas.microsoft.com/office/drawing/2010/main" xmlns:p="http://schemas.openxmlformats.org/presentationml/2006/main" xmlns:r="http://schemas.openxmlformats.org/officeDocument/2006/relationships" xmlns:a="http://schemas.openxmlformats.org/drawingml/2006/main" xmlns="" val="0"/>
+              </a:ext>
+            </a:extLst>
+          </a:blip>
+          <a:srcRect/>
+          <a:stretch>
+            <a:fillRect/>
+          </a:stretch>
+        </p:blipFill>
+        <p:spPr bwMode="auto">
+          <a:xfrm>
+            <a:off x="4038600" y="4315091"/>
+            <a:ext cx="4876800" cy="1126835"/>
+          </a:xfrm>
+          <a:prstGeom prst="rect">
+            <a:avLst/>
+          </a:prstGeom>
+          <a:noFill/>
+          <a:extLst>
+            <a:ext uri="{909E8E84-426E-40DD-AFC4-6F175D3DCCD1}">
+              <a14:hiddenFill xmlns:mc="http://schemas.openxmlformats.org/markup-compatibility/2006" xmlns:mv="urn:schemas-microsoft-com:mac:vml" xmlns:a14="http://schemas.microsoft.com/office/drawing/2010/main" xmlns:p="http://schemas.openxmlformats.org/presentationml/2006/main" xmlns:r="http://schemas.openxmlformats.org/officeDocument/2006/relationships" xmlns:a="http://schemas.openxmlformats.org/drawingml/2006/main" xmlns="">
+                <a:solidFill>
+                  <a:srgbClr val="FFFFFF"/>
+                </a:solidFill>
+              </a14:hiddenFill>
+            </a:ext>
+          </a:extLst>
+        </p:spPr>
+      </p:pic>
+      <p:sp>
+        <p:nvSpPr>
+          <p:cNvPr id="53" name="Rectangle 52"/>
+          <p:cNvSpPr/>
+          <p:nvPr/>
+        </p:nvSpPr>
+        <p:spPr>
+          <a:xfrm>
+            <a:off x="5029200" y="4470361"/>
+            <a:ext cx="3124199" cy="584776"/>
+          </a:xfrm>
+          <a:prstGeom prst="rect">
+            <a:avLst/>
+          </a:prstGeom>
+        </p:spPr>
+        <p:txBody>
+          <a:bodyPr wrap="square">
+            <a:spAutoFit/>
+          </a:bodyPr>
+          <a:lstStyle/>
+          <a:p>
+            <a:r>
+              <a:rPr lang="fr-FR" sz="1600" dirty="0" err="1" smtClean="0"/>
+              <a:t>Other</a:t>
+            </a:r>
+            <a:r>
+              <a:rPr lang="fr-FR" sz="1600" dirty="0" smtClean="0"/>
+              <a:t> </a:t>
+            </a:r>
+            <a:r>
+              <a:rPr lang="fr-FR" sz="1600" dirty="0" err="1" smtClean="0"/>
+              <a:t>dockerized</a:t>
+            </a:r>
+            <a:r>
+              <a:rPr lang="fr-FR" sz="1600" dirty="0" smtClean="0"/>
+              <a:t> </a:t>
+            </a:r>
+            <a:r>
+              <a:rPr lang="fr-FR" sz="1600" dirty="0" err="1" smtClean="0"/>
+              <a:t>reTHINK</a:t>
+            </a:r>
+            <a:r>
+              <a:rPr lang="fr-FR" sz="1600" dirty="0" smtClean="0"/>
+              <a:t> services</a:t>
+            </a:r>
+          </a:p>
+          <a:p>
+            <a:r>
+              <a:rPr lang="fr-FR" sz="1600" dirty="0" smtClean="0"/>
+              <a:t>(</a:t>
+            </a:r>
+            <a:r>
+              <a:rPr lang="fr-FR" sz="1600" dirty="0" err="1" smtClean="0"/>
+              <a:t>tbd</a:t>
+            </a:r>
+            <a:r>
+              <a:rPr lang="fr-FR" sz="1600" dirty="0" smtClean="0"/>
+              <a:t>.)</a:t>
+            </a:r>
+            <a:endParaRPr lang="fr-FR" sz="1600" dirty="0"/>
+          </a:p>
+        </p:txBody>
+      </p:sp>
+      <p:sp>
+        <p:nvSpPr>
+          <p:cNvPr id="20" name="Rectangle à coins arrondis 6"/>
+          <p:cNvSpPr/>
+          <p:nvPr/>
+        </p:nvSpPr>
+        <p:spPr>
+          <a:xfrm>
+            <a:off x="1219200" y="2362200"/>
+            <a:ext cx="6553200" cy="304800"/>
+          </a:xfrm>
+          <a:prstGeom prst="roundRect">
+            <a:avLst/>
+          </a:prstGeom>
+          <a:solidFill>
+            <a:schemeClr val="tx2">
+              <a:lumMod val="20000"/>
+              <a:lumOff val="80000"/>
+            </a:schemeClr>
+          </a:solidFill>
+          <a:ln>
+            <a:noFill/>
+          </a:ln>
+          <a:effectLst>
+            <a:outerShdw blurRad="44450" dist="27940" dir="5400000" algn="ctr">
+              <a:srgbClr val="000000">
+                <a:alpha val="32000"/>
+              </a:srgbClr>
+            </a:outerShdw>
+          </a:effectLst>
+          <a:scene3d>
+            <a:camera prst="orthographicFront">
+              <a:rot lat="0" lon="0" rev="0"/>
+            </a:camera>
+            <a:lightRig rig="balanced" dir="t">
+              <a:rot lat="0" lon="0" rev="8700000"/>
+            </a:lightRig>
+          </a:scene3d>
+          <a:sp3d>
+            <a:bevelT w="190500" h="38100"/>
+          </a:sp3d>
+        </p:spPr>
+        <p:style>
+          <a:lnRef idx="2">
+            <a:schemeClr val="accent1">
+              <a:shade val="50000"/>
+            </a:schemeClr>
+          </a:lnRef>
+          <a:fillRef idx="1">
+            <a:schemeClr val="accent1"/>
+          </a:fillRef>
+          <a:effectRef idx="0">
+            <a:schemeClr val="accent1"/>
+          </a:effectRef>
+          <a:fontRef idx="minor">
+            <a:schemeClr val="lt1"/>
+          </a:fontRef>
+        </p:style>
+        <p:txBody>
+          <a:bodyPr rtlCol="0" anchor="ctr"/>
+          <a:lstStyle/>
+          <a:p>
+            <a:pPr algn="ctr"/>
+            <a:r>
+              <a:rPr lang="fr-FR" dirty="0" smtClean="0"/>
+              <a:t>Firewall</a:t>
+            </a:r>
+            <a:endParaRPr lang="en-US" dirty="0"/>
+          </a:p>
+        </p:txBody>
+      </p:sp>
+      <p:sp>
+        <p:nvSpPr>
+          <p:cNvPr id="21" name="Rectangle 33"/>
+          <p:cNvSpPr/>
+          <p:nvPr/>
+        </p:nvSpPr>
+        <p:spPr>
+          <a:xfrm>
+            <a:off x="3048000" y="1521023"/>
+            <a:ext cx="2826427" cy="307777"/>
+          </a:xfrm>
+          <a:prstGeom prst="rect">
+            <a:avLst/>
+          </a:prstGeom>
+        </p:spPr>
+        <p:txBody>
+          <a:bodyPr wrap="none">
+            <a:spAutoFit/>
+          </a:bodyPr>
+          <a:lstStyle/>
+          <a:p>
+            <a:r>
+              <a:rPr lang="fr-FR" sz="1400" dirty="0" smtClean="0">
+                <a:solidFill>
+                  <a:srgbClr val="0000FF"/>
+                </a:solidFill>
+              </a:rPr>
+              <a:t>rethink-node-01.fokus.fraunhofer.de</a:t>
+            </a:r>
+          </a:p>
+        </p:txBody>
+      </p:sp>
+      <p:cxnSp>
+        <p:nvCxnSpPr>
+          <p:cNvPr id="22" name="Gerade Verbindung mit Pfeil 21"/>
+          <p:cNvCxnSpPr/>
+          <p:nvPr/>
+        </p:nvCxnSpPr>
+        <p:spPr>
+          <a:xfrm rot="5400000">
+            <a:off x="2551905" y="2552700"/>
+            <a:ext cx="1447800" cy="1588"/>
+          </a:xfrm>
+          <a:prstGeom prst="straightConnector1">
+            <a:avLst/>
+          </a:prstGeom>
+          <a:ln>
+            <a:solidFill>
+              <a:schemeClr val="tx1"/>
+            </a:solidFill>
+            <a:tailEnd type="arrow"/>
+          </a:ln>
+        </p:spPr>
+        <p:style>
+          <a:lnRef idx="2">
+            <a:schemeClr val="accent1"/>
+          </a:lnRef>
+          <a:fillRef idx="0">
+            <a:schemeClr val="accent1"/>
+          </a:fillRef>
+          <a:effectRef idx="1">
+            <a:schemeClr val="accent1"/>
+          </a:effectRef>
+          <a:fontRef idx="minor">
+            <a:schemeClr val="tx1"/>
+          </a:fontRef>
+        </p:style>
+      </p:cxnSp>
+      <p:cxnSp>
+        <p:nvCxnSpPr>
+          <p:cNvPr id="23" name="Gerade Verbindung mit Pfeil 22"/>
+          <p:cNvCxnSpPr/>
+          <p:nvPr/>
+        </p:nvCxnSpPr>
+        <p:spPr>
+          <a:xfrm rot="5400000">
+            <a:off x="2858294" y="2551906"/>
+            <a:ext cx="1447800" cy="1588"/>
+          </a:xfrm>
+          <a:prstGeom prst="straightConnector1">
+            <a:avLst/>
+          </a:prstGeom>
+          <a:ln>
+            <a:solidFill>
+              <a:schemeClr val="tx1"/>
+            </a:solidFill>
+            <a:tailEnd type="arrow"/>
+          </a:ln>
+        </p:spPr>
+        <p:style>
+          <a:lnRef idx="2">
+            <a:schemeClr val="accent1"/>
+          </a:lnRef>
+          <a:fillRef idx="0">
+            <a:schemeClr val="accent1"/>
+          </a:fillRef>
+          <a:effectRef idx="1">
+            <a:schemeClr val="accent1"/>
+          </a:effectRef>
+          <a:fontRef idx="minor">
+            <a:schemeClr val="tx1"/>
+          </a:fontRef>
+        </p:style>
+      </p:cxnSp>
+      <p:cxnSp>
+        <p:nvCxnSpPr>
+          <p:cNvPr id="24" name="Gerade Verbindung mit Pfeil 23"/>
+          <p:cNvCxnSpPr/>
+          <p:nvPr/>
+        </p:nvCxnSpPr>
+        <p:spPr>
+          <a:xfrm rot="5400000">
+            <a:off x="4533900" y="2552700"/>
+            <a:ext cx="1447800" cy="1588"/>
+          </a:xfrm>
+          <a:prstGeom prst="straightConnector1">
+            <a:avLst/>
+          </a:prstGeom>
+          <a:ln>
+            <a:solidFill>
+              <a:schemeClr val="tx1"/>
+            </a:solidFill>
+            <a:tailEnd type="arrow"/>
+          </a:ln>
+        </p:spPr>
+        <p:style>
+          <a:lnRef idx="2">
+            <a:schemeClr val="accent1"/>
+          </a:lnRef>
+          <a:fillRef idx="0">
+            <a:schemeClr val="accent1"/>
+          </a:fillRef>
+          <a:effectRef idx="1">
+            <a:schemeClr val="accent1"/>
+          </a:effectRef>
+          <a:fontRef idx="minor">
+            <a:schemeClr val="tx1"/>
+          </a:fontRef>
+        </p:style>
+      </p:cxnSp>
+      <p:cxnSp>
+        <p:nvCxnSpPr>
+          <p:cNvPr id="25" name="Gerade Verbindung mit Pfeil 24"/>
+          <p:cNvCxnSpPr/>
+          <p:nvPr/>
+        </p:nvCxnSpPr>
+        <p:spPr>
+          <a:xfrm rot="5400000">
+            <a:off x="4915694" y="2551906"/>
+            <a:ext cx="1447800" cy="1588"/>
+          </a:xfrm>
+          <a:prstGeom prst="straightConnector1">
+            <a:avLst/>
+          </a:prstGeom>
+          <a:ln>
+            <a:solidFill>
+              <a:schemeClr val="tx1"/>
+            </a:solidFill>
+            <a:tailEnd type="arrow"/>
+          </a:ln>
+        </p:spPr>
+        <p:style>
+          <a:lnRef idx="2">
+            <a:schemeClr val="accent1"/>
+          </a:lnRef>
+          <a:fillRef idx="0">
+            <a:schemeClr val="accent1"/>
+          </a:fillRef>
+          <a:effectRef idx="1">
+            <a:schemeClr val="accent1"/>
+          </a:effectRef>
+          <a:fontRef idx="minor">
+            <a:schemeClr val="tx1"/>
+          </a:fontRef>
+        </p:style>
+      </p:cxnSp>
+      <p:pic>
+        <p:nvPicPr>
+          <p:cNvPr id="26" name="Picture 2" descr="https://www.docker.com/sites/default/files/container_1.png"/>
+          <p:cNvPicPr>
+            <a:picLocks noChangeAspect="1" noChangeArrowheads="1"/>
+          </p:cNvPicPr>
+          <p:nvPr/>
+        </p:nvPicPr>
+        <p:blipFill>
+          <a:blip r:embed="rId2">
+            <a:extLst>
+              <a:ext uri="{28A0092B-C50C-407E-A947-70E740481C1C}">
+                <a14:useLocalDpi xmlns:mc="http://schemas.openxmlformats.org/markup-compatibility/2006" xmlns:mv="urn:schemas-microsoft-com:mac:vml" xmlns:a14="http://schemas.microsoft.com/office/drawing/2010/main" xmlns:p="http://schemas.openxmlformats.org/presentationml/2006/main" xmlns:r="http://schemas.openxmlformats.org/officeDocument/2006/relationships" xmlns:a="http://schemas.openxmlformats.org/drawingml/2006/main" xmlns="" val="0"/>
+              </a:ext>
+            </a:extLst>
+          </a:blip>
+          <a:srcRect/>
+          <a:stretch>
+            <a:fillRect/>
+          </a:stretch>
+        </p:blipFill>
+        <p:spPr bwMode="auto">
+          <a:xfrm>
+            <a:off x="1734056" y="4315091"/>
+            <a:ext cx="1771144" cy="1126835"/>
+          </a:xfrm>
+          <a:prstGeom prst="rect">
+            <a:avLst/>
+          </a:prstGeom>
+          <a:noFill/>
+          <a:extLst>
+            <a:ext uri="{909E8E84-426E-40DD-AFC4-6F175D3DCCD1}">
+              <a14:hiddenFill xmlns:mc="http://schemas.openxmlformats.org/markup-compatibility/2006" xmlns:mv="urn:schemas-microsoft-com:mac:vml" xmlns:a14="http://schemas.microsoft.com/office/drawing/2010/main" xmlns:p="http://schemas.openxmlformats.org/presentationml/2006/main" xmlns:r="http://schemas.openxmlformats.org/officeDocument/2006/relationships" xmlns:a="http://schemas.openxmlformats.org/drawingml/2006/main" xmlns="">
+                <a:solidFill>
+                  <a:srgbClr val="FFFFFF"/>
+                </a:solidFill>
+              </a14:hiddenFill>
+            </a:ext>
+          </a:extLst>
+        </p:spPr>
+      </p:pic>
+      <p:sp>
+        <p:nvSpPr>
+          <p:cNvPr id="27" name="Rectangle 41"/>
+          <p:cNvSpPr/>
+          <p:nvPr/>
+        </p:nvSpPr>
+        <p:spPr>
+          <a:xfrm>
+            <a:off x="2094965" y="4416115"/>
+            <a:ext cx="1257835" cy="584776"/>
+          </a:xfrm>
+          <a:prstGeom prst="rect">
+            <a:avLst/>
+          </a:prstGeom>
+        </p:spPr>
+        <p:txBody>
+          <a:bodyPr wrap="square">
+            <a:spAutoFit/>
+          </a:bodyPr>
+          <a:lstStyle/>
+          <a:p>
+            <a:r>
+              <a:rPr lang="fr-FR" sz="1600" dirty="0" smtClean="0"/>
+              <a:t>Catalogue </a:t>
+            </a:r>
+            <a:r>
+              <a:rPr lang="fr-FR" sz="1600" dirty="0" err="1" smtClean="0"/>
+              <a:t>Database</a:t>
+            </a:r>
+            <a:endParaRPr lang="fr-FR" sz="1600" dirty="0" smtClean="0">
+              <a:solidFill>
+                <a:srgbClr val="0000FF"/>
+              </a:solidFill>
+            </a:endParaRPr>
+          </a:p>
+        </p:txBody>
+      </p:sp>
+      <p:pic>
+        <p:nvPicPr>
+          <p:cNvPr id="28" name="Picture 2" descr="https://www.docker.com/sites/default/files/container_1.png"/>
+          <p:cNvPicPr>
+            <a:picLocks noChangeAspect="1" noChangeArrowheads="1"/>
+          </p:cNvPicPr>
+          <p:nvPr/>
+        </p:nvPicPr>
+        <p:blipFill>
+          <a:blip r:embed="rId2">
+            <a:extLst>
+              <a:ext uri="{28A0092B-C50C-407E-A947-70E740481C1C}">
+                <a14:useLocalDpi xmlns:mc="http://schemas.openxmlformats.org/markup-compatibility/2006" xmlns:mv="urn:schemas-microsoft-com:mac:vml" xmlns:a14="http://schemas.microsoft.com/office/drawing/2010/main" xmlns:p="http://schemas.openxmlformats.org/presentationml/2006/main" xmlns:r="http://schemas.openxmlformats.org/officeDocument/2006/relationships" xmlns:a="http://schemas.openxmlformats.org/drawingml/2006/main" xmlns="" val="0"/>
+              </a:ext>
+            </a:extLst>
+          </a:blip>
+          <a:srcRect/>
+          <a:stretch>
+            <a:fillRect/>
+          </a:stretch>
+        </p:blipFill>
+        <p:spPr bwMode="auto">
+          <a:xfrm>
+            <a:off x="3048000" y="4315091"/>
+            <a:ext cx="1771144" cy="1126835"/>
+          </a:xfrm>
+          <a:prstGeom prst="rect">
+            <a:avLst/>
+          </a:prstGeom>
+          <a:noFill/>
+          <a:extLst>
+            <a:ext uri="{909E8E84-426E-40DD-AFC4-6F175D3DCCD1}">
+              <a14:hiddenFill xmlns:mc="http://schemas.openxmlformats.org/markup-compatibility/2006" xmlns:mv="urn:schemas-microsoft-com:mac:vml" xmlns:a14="http://schemas.microsoft.com/office/drawing/2010/main" xmlns:p="http://schemas.openxmlformats.org/presentationml/2006/main" xmlns:r="http://schemas.openxmlformats.org/officeDocument/2006/relationships" xmlns:a="http://schemas.openxmlformats.org/drawingml/2006/main" xmlns="">
+                <a:solidFill>
+                  <a:srgbClr val="FFFFFF"/>
+                </a:solidFill>
+              </a14:hiddenFill>
+            </a:ext>
+          </a:extLst>
+        </p:spPr>
+      </p:pic>
+      <p:sp>
+        <p:nvSpPr>
+          <p:cNvPr id="29" name="Rectangle 41"/>
+          <p:cNvSpPr/>
+          <p:nvPr/>
+        </p:nvSpPr>
+        <p:spPr>
+          <a:xfrm>
+            <a:off x="3408909" y="4371069"/>
+            <a:ext cx="1257835" cy="584776"/>
+          </a:xfrm>
+          <a:prstGeom prst="rect">
+            <a:avLst/>
+          </a:prstGeom>
+        </p:spPr>
+        <p:txBody>
+          <a:bodyPr wrap="square">
+            <a:spAutoFit/>
+          </a:bodyPr>
+          <a:lstStyle/>
+          <a:p>
+            <a:r>
+              <a:rPr lang="fr-FR" sz="1600" dirty="0" smtClean="0"/>
+              <a:t>Catalogue </a:t>
+            </a:r>
+            <a:r>
+              <a:rPr lang="fr-FR" sz="1600" dirty="0" err="1" smtClean="0"/>
+              <a:t>test-client</a:t>
+            </a:r>
+            <a:endParaRPr lang="fr-FR" sz="1600" dirty="0" smtClean="0">
+              <a:solidFill>
+                <a:srgbClr val="0000FF"/>
+              </a:solidFill>
+            </a:endParaRPr>
+          </a:p>
+        </p:txBody>
+      </p:sp>
+    </p:spTree>
+    <p:extLst>
+      <p:ext uri="{BB962C8B-B14F-4D97-AF65-F5344CB8AC3E}">
+        <p14:creationId xmlns:mc="http://schemas.openxmlformats.org/markup-compatibility/2006" xmlns:mv="urn:schemas-microsoft-com:mac:vml" xmlns:p14="http://schemas.microsoft.com/office/powerpoint/2010/main" xmlns:p="http://schemas.openxmlformats.org/presentationml/2006/main" xmlns:r="http://schemas.openxmlformats.org/officeDocument/2006/relationships" xmlns:a="http://schemas.openxmlformats.org/drawingml/2006/main" xmlns="" val="2580360701"/>
       </p:ext>
     </p:extLst>
   </p:cSld>

</xml_diff>